<commit_message>
Updated license page for ATPESC 2020
</commit_message>
<xml_diff>
--- a/presentations/license-master.pptx
+++ b/presentations/license-master.pptx
@@ -255,7 +255,7 @@
           <a:p>
             <a:fld id="{0B842F42-2CE9-4E35-95C1-410DC08A50B1}" type="datetimeFigureOut">
               <a:rPr lang="en-US" smtClean="0"/>
-              <a:t>2/29/2020</a:t>
+              <a:t>7/25/2020</a:t>
             </a:fld>
             <a:endParaRPr lang="en-US"/>
           </a:p>
@@ -420,7 +420,7 @@
           <a:p>
             <a:fld id="{6F282904-F315-4730-8D91-37D99E141A6F}" type="datetimeFigureOut">
               <a:rPr lang="en-US" smtClean="0"/>
-              <a:t>2/29/2020</a:t>
+              <a:t>7/25/2020</a:t>
             </a:fld>
             <a:endParaRPr lang="en-US"/>
           </a:p>
@@ -3596,23 +3596,23 @@
               </a:spcBef>
             </a:pPr>
             <a:r>
-              <a:rPr lang="en-US" sz="1800" dirty="0"/>
+              <a:rPr lang="en-US" sz="1600" dirty="0"/>
               <a:t>This work is licensed under a </a:t>
             </a:r>
             <a:r>
-              <a:rPr lang="en-US" sz="1800" dirty="0">
+              <a:rPr lang="en-US" sz="1600" dirty="0">
                 <a:hlinkClick r:id="rId2"/>
               </a:rPr>
               <a:t>Creative</a:t>
             </a:r>
             <a:r>
-              <a:rPr lang="en-US" sz="1800" dirty="0">
+              <a:rPr lang="en-US" sz="1600" dirty="0">
                 <a:hlinkClick r:id="rId3"/>
               </a:rPr>
               <a:t> Commons Attribution 4.0 International License</a:t>
             </a:r>
             <a:r>
-              <a:rPr lang="en-US" sz="1800" dirty="0"/>
+              <a:rPr lang="en-US" sz="1600" dirty="0"/>
               <a:t> (CC BY 4.0).</a:t>
             </a:r>
           </a:p>
@@ -3623,24 +3623,24 @@
               </a:spcBef>
             </a:pPr>
             <a:r>
-              <a:rPr lang="en-US" sz="1800" b="1" dirty="0"/>
-              <a:t>The requested citation the overall tutorial is: David E. Bernholdt, Better Scientific Software tutorial, in RF </a:t>
-            </a:r>
-            <a:r>
-              <a:rPr lang="en-US" sz="1800" b="1" dirty="0" err="1"/>
-              <a:t>SciDAC</a:t>
-            </a:r>
-            <a:r>
-              <a:rPr lang="en-US" sz="1800" b="1" dirty="0"/>
-              <a:t> 2020 Workshop, Knoxville, Tennessee. DOI: </a:t>
-            </a:r>
-            <a:r>
-              <a:rPr lang="en-US" sz="1800" b="1" dirty="0">
+              <a:rPr lang="en-US" sz="1600" b="1" dirty="0"/>
+              <a:t>The requested citation the overall tutorial is: David E. Bernholdt, Anshu Dubey, Mark C. Miller, Katherine M. Riley, and James M. </a:t>
+            </a:r>
+            <a:r>
+              <a:rPr lang="en-US" sz="1600" b="1" dirty="0" err="1"/>
+              <a:t>Willenbring</a:t>
+            </a:r>
+            <a:r>
+              <a:rPr lang="en-US" sz="1600" b="1" dirty="0"/>
+              <a:t>, Software Productivity Track, in Argonne Training Program for Extreme Scale Computing (ATPESC), online. DOI: </a:t>
+            </a:r>
+            <a:r>
+              <a:rPr lang="en-US" sz="1600" b="1" dirty="0">
                 <a:hlinkClick r:id="rId4"/>
               </a:rPr>
-              <a:t>10.6084/m9.figshare.11918397</a:t>
-            </a:r>
-            <a:endParaRPr lang="en-US" sz="1800" b="1" dirty="0"/>
+              <a:t>10.6084/m9.figshare.12719834</a:t>
+            </a:r>
+            <a:endParaRPr lang="en-US" sz="1600" b="1" dirty="0"/>
           </a:p>
           <a:p>
             <a:pPr>
@@ -3649,16 +3649,16 @@
               </a:spcBef>
             </a:pPr>
             <a:r>
-              <a:rPr lang="en-US" sz="1800" dirty="0"/>
+              <a:rPr lang="en-US" sz="1600" dirty="0"/>
               <a:t>Individual modules may be cited as </a:t>
             </a:r>
             <a:r>
-              <a:rPr lang="en-US" sz="1800" i="1" dirty="0"/>
+              <a:rPr lang="en-US" sz="1600" i="1" dirty="0"/>
               <a:t>Speaker, Module Title</a:t>
             </a:r>
             <a:r>
-              <a:rPr lang="en-US" sz="1800" dirty="0"/>
-              <a:t>, in Better Scientific Software Tutorial…</a:t>
+              <a:rPr lang="en-US" sz="1600" dirty="0"/>
+              <a:t>, in Software Productivity Track…</a:t>
             </a:r>
           </a:p>
           <a:p>
@@ -3673,12 +3673,12 @@
           <a:p>
             <a:pPr>
               <a:spcBef>
-                <a:spcPts val="0"/>
+                <a:spcPts val="400"/>
               </a:spcBef>
             </a:pPr>
             <a:r>
               <a:rPr lang="en-US" sz="1600" dirty="0"/>
-              <a:t>Additional contributors to this this tutorial include: Anshu Dubey, Mike </a:t>
+              <a:t>Additional contributors include: Patricia Grubel, Rinku Gupta, Mike </a:t>
             </a:r>
             <a:r>
               <a:rPr lang="en-US" sz="1600" dirty="0" err="1"/>
@@ -3694,18 +3694,13 @@
             </a:r>
             <a:r>
               <a:rPr lang="en-US" sz="1600" dirty="0"/>
-              <a:t>, Jared O’Neal, and Katherine Riley, James M. </a:t>
-            </a:r>
-            <a:r>
-              <a:rPr lang="en-US" sz="1600" dirty="0" err="1"/>
-              <a:t>Willenbring</a:t>
-            </a:r>
-            <a:endParaRPr lang="en-US" sz="1600" dirty="0"/>
+              <a:t>, Jared O’Neal, David Rogers</a:t>
+            </a:r>
           </a:p>
           <a:p>
             <a:pPr>
               <a:spcBef>
-                <a:spcPts val="600"/>
+                <a:spcPts val="400"/>
               </a:spcBef>
             </a:pPr>
             <a:r>
@@ -3729,20 +3724,12 @@
           <a:p>
             <a:pPr>
               <a:spcBef>
-                <a:spcPts val="600"/>
+                <a:spcPts val="400"/>
               </a:spcBef>
             </a:pPr>
             <a:r>
               <a:rPr lang="en-US" sz="1600" dirty="0"/>
-              <a:t>This work was performed in part at the Argonne National Laboratory, which is managed </a:t>
-            </a:r>
-            <a:r>
-              <a:rPr lang="en-US" sz="1600" dirty="0" err="1"/>
-              <a:t>managed</a:t>
-            </a:r>
-            <a:r>
-              <a:rPr lang="en-US" sz="1600" dirty="0"/>
-              <a:t> by </a:t>
+              <a:t>This work was performed in part at the Argonne National Laboratory, which is managed by </a:t>
             </a:r>
             <a:r>
               <a:rPr lang="en-US" sz="1600" dirty="0" err="1"/>
@@ -3756,7 +3743,7 @@
           <a:p>
             <a:pPr>
               <a:spcBef>
-                <a:spcPts val="600"/>
+                <a:spcPts val="400"/>
               </a:spcBef>
             </a:pPr>
             <a:r>
@@ -3767,12 +3754,23 @@
           <a:p>
             <a:pPr>
               <a:spcBef>
-                <a:spcPts val="600"/>
+                <a:spcPts val="400"/>
               </a:spcBef>
             </a:pPr>
             <a:r>
               <a:rPr lang="en-US" sz="1600" dirty="0"/>
-              <a:t>This work was performed in part at Sandia National Laboratories. Sandia National Laboratories is a multi-mission laboratory managed and operated by National Technology and Engineering Solutions of Sandia, LLC., a wholly owned subsidiary of Honeywell International, Inc., for the U.S. Department of Energy’s National Nuclear Security Administration under contract DE-NA0003525. SAND NO SAND2017-5474 PE</a:t>
+              <a:t>This work was performed in part at the Lawrence Livermore National Laboratory, which is managed by Lawrence Livermore National Security, LLC for the U.S. Department of Energy under Contract No. DE-AC52-07NA27344.</a:t>
+            </a:r>
+          </a:p>
+          <a:p>
+            <a:pPr>
+              <a:spcBef>
+                <a:spcPts val="400"/>
+              </a:spcBef>
+            </a:pPr>
+            <a:r>
+              <a:rPr lang="en-US" sz="1600" dirty="0"/>
+              <a:t>This work was performed in part at Sandia National Laboratories. Sandia National Laboratories is a multi-mission laboratory managed and operated by National Technology and Engineering Solutions of Sandia, LLC., a wholly owned subsidiary of Honeywell International, Inc., for the U.S. Department of Energy’s National Nuclear Security Administration under contract DE-NA0003525.</a:t>
             </a:r>
           </a:p>
         </p:txBody>
@@ -4750,21 +4748,6 @@
 </file>
 
 <file path=customXml/item1.xml><?xml version="1.0" encoding="utf-8"?>
-<p:properties xmlns:p="http://schemas.microsoft.com/office/2006/metadata/properties" xmlns:xsi="http://www.w3.org/2001/XMLSchema-instance" xmlns:pc="http://schemas.microsoft.com/office/infopath/2007/PartnerControls">
-  <documentManagement/>
-</p:properties>
-</file>
-
-<file path=customXml/item2.xml><?xml version="1.0" encoding="utf-8"?>
-<?mso-contentType ?>
-<FormTemplates xmlns="http://schemas.microsoft.com/sharepoint/v3/contenttype/forms">
-  <Display>DocumentLibraryForm</Display>
-  <Edit>DocumentLibraryForm</Edit>
-  <New>DocumentLibraryForm</New>
-</FormTemplates>
-</file>
-
-<file path=customXml/item3.xml><?xml version="1.0" encoding="utf-8"?>
 <ct:contentTypeSchema xmlns:ct="http://schemas.microsoft.com/office/2006/metadata/contentType" xmlns:ma="http://schemas.microsoft.com/office/2006/metadata/properties/metaAttributes" ct:_="" ma:_="" ma:contentTypeName="Document" ma:contentTypeID="0x010100565464437F680748A68B85EB6594EA7D" ma:contentTypeVersion="0" ma:contentTypeDescription="Create a new document." ma:contentTypeScope="" ma:versionID="fe3f4dd58d5914c51cfc6deaa8ad845c">
   <xsd:schema xmlns:xsd="http://www.w3.org/2001/XMLSchema" xmlns:p="http://schemas.microsoft.com/office/2006/metadata/properties" targetNamespace="http://schemas.microsoft.com/office/2006/metadata/properties" ma:root="true" ma:fieldsID="4aeb20c0e3442673af7ee10786458764">
     <xsd:element name="properties">
@@ -4813,17 +4796,32 @@
 </ct:contentTypeSchema>
 </file>
 
+<file path=customXml/item2.xml><?xml version="1.0" encoding="utf-8"?>
+<?mso-contentType ?>
+<FormTemplates xmlns="http://schemas.microsoft.com/sharepoint/v3/contenttype/forms">
+  <Display>DocumentLibraryForm</Display>
+  <Edit>DocumentLibraryForm</Edit>
+  <New>DocumentLibraryForm</New>
+</FormTemplates>
+</file>
+
+<file path=customXml/item3.xml><?xml version="1.0" encoding="utf-8"?>
+<p:properties xmlns:p="http://schemas.microsoft.com/office/2006/metadata/properties" xmlns:xsi="http://www.w3.org/2001/XMLSchema-instance" xmlns:pc="http://schemas.microsoft.com/office/infopath/2007/PartnerControls">
+  <documentManagement/>
+</p:properties>
+</file>
+
 <file path=customXml/itemProps1.xml><?xml version="1.0" encoding="utf-8"?>
-<ds:datastoreItem xmlns:ds="http://schemas.openxmlformats.org/officeDocument/2006/customXml" ds:itemID="{A50EC660-24D0-43A0-AE5E-E274115E726B}">
+<ds:datastoreItem xmlns:ds="http://schemas.openxmlformats.org/officeDocument/2006/customXml" ds:itemID="{E8DB7DEB-074E-4EE8-9B6E-FD277323109C}">
   <ds:schemaRefs>
+    <ds:schemaRef ds:uri="http://schemas.microsoft.com/office/2006/metadata/contentType"/>
+    <ds:schemaRef ds:uri="http://schemas.microsoft.com/office/2006/metadata/properties/metaAttributes"/>
+    <ds:schemaRef ds:uri="http://www.w3.org/2001/XMLSchema"/>
+    <ds:schemaRef ds:uri="http://schemas.microsoft.com/office/2006/metadata/properties"/>
+    <ds:schemaRef ds:uri="http://schemas.openxmlformats.org/package/2006/metadata/core-properties"/>
     <ds:schemaRef ds:uri="http://purl.org/dc/elements/1.1/"/>
-    <ds:schemaRef ds:uri="http://schemas.microsoft.com/office/2006/metadata/properties"/>
     <ds:schemaRef ds:uri="http://purl.org/dc/terms/"/>
-    <ds:schemaRef ds:uri="http://schemas.openxmlformats.org/package/2006/metadata/core-properties"/>
-    <ds:schemaRef ds:uri="http://schemas.microsoft.com/office/2006/documentManagement/types"/>
-    <ds:schemaRef ds:uri="http://www.w3.org/XML/1998/namespace"/>
-    <ds:schemaRef ds:uri="http://purl.org/dc/dcmitype/"/>
-    <ds:schemaRef ds:uri="http://schemas.microsoft.com/office/infopath/2007/PartnerControls"/>
+    <ds:schemaRef ds:uri="http://schemas.microsoft.com/office/internal/2005/internalDocumentation"/>
   </ds:schemaRefs>
 </ds:datastoreItem>
 </file>
@@ -4837,16 +4835,16 @@
 </file>
 
 <file path=customXml/itemProps3.xml><?xml version="1.0" encoding="utf-8"?>
-<ds:datastoreItem xmlns:ds="http://schemas.openxmlformats.org/officeDocument/2006/customXml" ds:itemID="{E8DB7DEB-074E-4EE8-9B6E-FD277323109C}">
+<ds:datastoreItem xmlns:ds="http://schemas.openxmlformats.org/officeDocument/2006/customXml" ds:itemID="{A50EC660-24D0-43A0-AE5E-E274115E726B}">
   <ds:schemaRefs>
-    <ds:schemaRef ds:uri="http://schemas.microsoft.com/office/2006/metadata/contentType"/>
-    <ds:schemaRef ds:uri="http://schemas.microsoft.com/office/2006/metadata/properties/metaAttributes"/>
-    <ds:schemaRef ds:uri="http://www.w3.org/2001/XMLSchema"/>
+    <ds:schemaRef ds:uri="http://purl.org/dc/elements/1.1/"/>
     <ds:schemaRef ds:uri="http://schemas.microsoft.com/office/2006/metadata/properties"/>
+    <ds:schemaRef ds:uri="http://purl.org/dc/terms/"/>
     <ds:schemaRef ds:uri="http://schemas.openxmlformats.org/package/2006/metadata/core-properties"/>
-    <ds:schemaRef ds:uri="http://purl.org/dc/elements/1.1/"/>
-    <ds:schemaRef ds:uri="http://purl.org/dc/terms/"/>
-    <ds:schemaRef ds:uri="http://schemas.microsoft.com/office/internal/2005/internalDocumentation"/>
+    <ds:schemaRef ds:uri="http://schemas.microsoft.com/office/2006/documentManagement/types"/>
+    <ds:schemaRef ds:uri="http://www.w3.org/XML/1998/namespace"/>
+    <ds:schemaRef ds:uri="http://purl.org/dc/dcmitype/"/>
+    <ds:schemaRef ds:uri="http://schemas.microsoft.com/office/infopath/2007/PartnerControls"/>
   </ds:schemaRefs>
 </ds:datastoreItem>
 </file>
</xml_diff>

<commit_message>
Correct omissions in license/acknowledgement slide
</commit_message>
<xml_diff>
--- a/presentations/license-master.pptx
+++ b/presentations/license-master.pptx
@@ -255,7 +255,7 @@
           <a:p>
             <a:fld id="{0B842F42-2CE9-4E35-95C1-410DC08A50B1}" type="datetimeFigureOut">
               <a:rPr lang="en-US" smtClean="0"/>
-              <a:t>7/25/2020</a:t>
+              <a:t>8/5/2020</a:t>
             </a:fld>
             <a:endParaRPr lang="en-US"/>
           </a:p>
@@ -420,7 +420,7 @@
           <a:p>
             <a:fld id="{6F282904-F315-4730-8D91-37D99E141A6F}" type="datetimeFigureOut">
               <a:rPr lang="en-US" smtClean="0"/>
-              <a:t>7/25/2020</a:t>
+              <a:t>8/5/2020</a:t>
             </a:fld>
             <a:endParaRPr lang="en-US"/>
           </a:p>
@@ -3632,7 +3632,15 @@
             </a:r>
             <a:r>
               <a:rPr lang="en-US" sz="1600" b="1" dirty="0"/>
-              <a:t>, Software Productivity Track, in Argonne Training Program for Extreme Scale Computing (ATPESC), online. DOI: </a:t>
+              <a:t>, Software Productivity Track, in Argonne Training Program for Extreme Scale Computing (ATPESC</a:t>
+            </a:r>
+            <a:r>
+              <a:rPr lang="en-US" sz="1600" b="1"/>
+              <a:t>), August 2020, online</a:t>
+            </a:r>
+            <a:r>
+              <a:rPr lang="en-US" sz="1600" b="1" dirty="0"/>
+              <a:t>. DOI: </a:t>
             </a:r>
             <a:r>
               <a:rPr lang="en-US" sz="1600" b="1" dirty="0">
@@ -3663,6 +3671,9 @@
           </a:p>
           <a:p>
             <a:pPr marL="0" indent="0">
+              <a:spcBef>
+                <a:spcPts val="800"/>
+              </a:spcBef>
               <a:buNone/>
             </a:pPr>
             <a:r>
@@ -3694,7 +3705,7 @@
             </a:r>
             <a:r>
               <a:rPr lang="en-US" sz="1600" dirty="0"/>
-              <a:t>, Jared O’Neal, David Rogers</a:t>
+              <a:t>, Jared O’Neal, David Rogers, Deborah Stevens</a:t>
             </a:r>
           </a:p>
           <a:p>
@@ -4748,6 +4759,12 @@
 </file>
 
 <file path=customXml/item1.xml><?xml version="1.0" encoding="utf-8"?>
+<p:properties xmlns:p="http://schemas.microsoft.com/office/2006/metadata/properties" xmlns:xsi="http://www.w3.org/2001/XMLSchema-instance" xmlns:pc="http://schemas.microsoft.com/office/infopath/2007/PartnerControls">
+  <documentManagement/>
+</p:properties>
+</file>
+
+<file path=customXml/item2.xml><?xml version="1.0" encoding="utf-8"?>
 <ct:contentTypeSchema xmlns:ct="http://schemas.microsoft.com/office/2006/metadata/contentType" xmlns:ma="http://schemas.microsoft.com/office/2006/metadata/properties/metaAttributes" ct:_="" ma:_="" ma:contentTypeName="Document" ma:contentTypeID="0x010100565464437F680748A68B85EB6594EA7D" ma:contentTypeVersion="0" ma:contentTypeDescription="Create a new document." ma:contentTypeScope="" ma:versionID="fe3f4dd58d5914c51cfc6deaa8ad845c">
   <xsd:schema xmlns:xsd="http://www.w3.org/2001/XMLSchema" xmlns:p="http://schemas.microsoft.com/office/2006/metadata/properties" targetNamespace="http://schemas.microsoft.com/office/2006/metadata/properties" ma:root="true" ma:fieldsID="4aeb20c0e3442673af7ee10786458764">
     <xsd:element name="properties">
@@ -4796,7 +4813,7 @@
 </ct:contentTypeSchema>
 </file>
 
-<file path=customXml/item2.xml><?xml version="1.0" encoding="utf-8"?>
+<file path=customXml/item3.xml><?xml version="1.0" encoding="utf-8"?>
 <?mso-contentType ?>
 <FormTemplates xmlns="http://schemas.microsoft.com/sharepoint/v3/contenttype/forms">
   <Display>DocumentLibraryForm</Display>
@@ -4805,13 +4822,22 @@
 </FormTemplates>
 </file>
 
-<file path=customXml/item3.xml><?xml version="1.0" encoding="utf-8"?>
-<p:properties xmlns:p="http://schemas.microsoft.com/office/2006/metadata/properties" xmlns:xsi="http://www.w3.org/2001/XMLSchema-instance" xmlns:pc="http://schemas.microsoft.com/office/infopath/2007/PartnerControls">
-  <documentManagement/>
-</p:properties>
+<file path=customXml/itemProps1.xml><?xml version="1.0" encoding="utf-8"?>
+<ds:datastoreItem xmlns:ds="http://schemas.openxmlformats.org/officeDocument/2006/customXml" ds:itemID="{A50EC660-24D0-43A0-AE5E-E274115E726B}">
+  <ds:schemaRefs>
+    <ds:schemaRef ds:uri="http://purl.org/dc/elements/1.1/"/>
+    <ds:schemaRef ds:uri="http://schemas.microsoft.com/office/2006/metadata/properties"/>
+    <ds:schemaRef ds:uri="http://purl.org/dc/terms/"/>
+    <ds:schemaRef ds:uri="http://schemas.openxmlformats.org/package/2006/metadata/core-properties"/>
+    <ds:schemaRef ds:uri="http://schemas.microsoft.com/office/2006/documentManagement/types"/>
+    <ds:schemaRef ds:uri="http://www.w3.org/XML/1998/namespace"/>
+    <ds:schemaRef ds:uri="http://purl.org/dc/dcmitype/"/>
+    <ds:schemaRef ds:uri="http://schemas.microsoft.com/office/infopath/2007/PartnerControls"/>
+  </ds:schemaRefs>
+</ds:datastoreItem>
 </file>
 
-<file path=customXml/itemProps1.xml><?xml version="1.0" encoding="utf-8"?>
+<file path=customXml/itemProps2.xml><?xml version="1.0" encoding="utf-8"?>
 <ds:datastoreItem xmlns:ds="http://schemas.openxmlformats.org/officeDocument/2006/customXml" ds:itemID="{E8DB7DEB-074E-4EE8-9B6E-FD277323109C}">
   <ds:schemaRefs>
     <ds:schemaRef ds:uri="http://schemas.microsoft.com/office/2006/metadata/contentType"/>
@@ -4826,25 +4852,10 @@
 </ds:datastoreItem>
 </file>
 
-<file path=customXml/itemProps2.xml><?xml version="1.0" encoding="utf-8"?>
+<file path=customXml/itemProps3.xml><?xml version="1.0" encoding="utf-8"?>
 <ds:datastoreItem xmlns:ds="http://schemas.openxmlformats.org/officeDocument/2006/customXml" ds:itemID="{19E20559-B232-4371-8690-E3D8007EDB82}">
   <ds:schemaRefs>
     <ds:schemaRef ds:uri="http://schemas.microsoft.com/sharepoint/v3/contenttype/forms"/>
   </ds:schemaRefs>
 </ds:datastoreItem>
-</file>
-
-<file path=customXml/itemProps3.xml><?xml version="1.0" encoding="utf-8"?>
-<ds:datastoreItem xmlns:ds="http://schemas.openxmlformats.org/officeDocument/2006/customXml" ds:itemID="{A50EC660-24D0-43A0-AE5E-E274115E726B}">
-  <ds:schemaRefs>
-    <ds:schemaRef ds:uri="http://purl.org/dc/elements/1.1/"/>
-    <ds:schemaRef ds:uri="http://schemas.microsoft.com/office/2006/metadata/properties"/>
-    <ds:schemaRef ds:uri="http://purl.org/dc/terms/"/>
-    <ds:schemaRef ds:uri="http://schemas.openxmlformats.org/package/2006/metadata/core-properties"/>
-    <ds:schemaRef ds:uri="http://schemas.microsoft.com/office/2006/documentManagement/types"/>
-    <ds:schemaRef ds:uri="http://www.w3.org/XML/1998/namespace"/>
-    <ds:schemaRef ds:uri="http://purl.org/dc/dcmitype/"/>
-    <ds:schemaRef ds:uri="http://schemas.microsoft.com/office/infopath/2007/PartnerControls"/>
-  </ds:schemaRefs>
-</ds:datastoreItem>
 </file>
</xml_diff>

<commit_message>
Partial updates for SC20
</commit_message>
<xml_diff>
--- a/presentations/license-master.pptx
+++ b/presentations/license-master.pptx
@@ -255,7 +255,7 @@
           <a:p>
             <a:fld id="{0B842F42-2CE9-4E35-95C1-410DC08A50B1}" type="datetimeFigureOut">
               <a:rPr lang="en-US" smtClean="0"/>
-              <a:t>8/5/2020</a:t>
+              <a:t>9/23/2020</a:t>
             </a:fld>
             <a:endParaRPr lang="en-US"/>
           </a:p>
@@ -420,7 +420,7 @@
           <a:p>
             <a:fld id="{6F282904-F315-4730-8D91-37D99E141A6F}" type="datetimeFigureOut">
               <a:rPr lang="en-US" smtClean="0"/>
-              <a:t>8/5/2020</a:t>
+              <a:t>9/23/2020</a:t>
             </a:fld>
             <a:endParaRPr lang="en-US"/>
           </a:p>
@@ -3624,29 +3624,13 @@
             </a:pPr>
             <a:r>
               <a:rPr lang="en-US" sz="1600" b="1" dirty="0"/>
-              <a:t>The requested citation the overall tutorial is: David E. Bernholdt, Anshu Dubey, Mark C. Miller, Katherine M. Riley, and James M. </a:t>
-            </a:r>
-            <a:r>
-              <a:rPr lang="en-US" sz="1600" b="1" dirty="0" err="1"/>
-              <a:t>Willenbring</a:t>
-            </a:r>
-            <a:r>
-              <a:rPr lang="en-US" sz="1600" b="1" dirty="0"/>
-              <a:t>, Software Productivity Track, in Argonne Training Program for Extreme Scale Computing (ATPESC</a:t>
-            </a:r>
-            <a:r>
-              <a:rPr lang="en-US" sz="1600" b="1"/>
-              <a:t>), August 2020, online</a:t>
-            </a:r>
-            <a:r>
-              <a:rPr lang="en-US" sz="1600" b="1" dirty="0"/>
-              <a:t>. DOI: </a:t>
+              <a:t>The requested citation the overall tutorial is: David E. Bernholdt, Anshu Dubey, Patricia A. Grubel, Rinku K. Gupta, Better Scientific Software tutorial, in SC ‘20: International Conference for High Performance Computing, Networking, Storage and Analysis, online, 2020. DOI: </a:t>
             </a:r>
             <a:r>
               <a:rPr lang="en-US" sz="1600" b="1" dirty="0">
                 <a:hlinkClick r:id="rId4"/>
               </a:rPr>
-              <a:t>10.6084/m9.figshare.12719834</a:t>
+              <a:t>10.6084/m9.figshare.12994376</a:t>
             </a:r>
             <a:endParaRPr lang="en-US" sz="1600" b="1" dirty="0"/>
           </a:p>
@@ -3666,7 +3650,7 @@
             </a:r>
             <a:r>
               <a:rPr lang="en-US" sz="1600" dirty="0"/>
-              <a:t>, in Software Productivity Track…</a:t>
+              <a:t>, in Better Scientific Software tutorial…</a:t>
             </a:r>
           </a:p>
           <a:p>
@@ -3689,7 +3673,7 @@
             </a:pPr>
             <a:r>
               <a:rPr lang="en-US" sz="1600" dirty="0"/>
-              <a:t>Additional contributors include: Patricia Grubel, Rinku Gupta, Mike </a:t>
+              <a:t>Additional contributors include: Mike </a:t>
             </a:r>
             <a:r>
               <a:rPr lang="en-US" sz="1600" dirty="0" err="1"/>
@@ -3705,8 +3689,13 @@
             </a:r>
             <a:r>
               <a:rPr lang="en-US" sz="1600" dirty="0"/>
-              <a:t>, Jared O’Neal, David Rogers, Deborah Stevens</a:t>
-            </a:r>
+              <a:t>, Mark Miller, Jared O’Neal, Katherine Riley, David Rogers, Deborah Stevens, James </a:t>
+            </a:r>
+            <a:r>
+              <a:rPr lang="en-US" sz="1600" dirty="0" err="1"/>
+              <a:t>Willenbring</a:t>
+            </a:r>
+            <a:endParaRPr lang="en-US" sz="1600" dirty="0"/>
           </a:p>
           <a:p>
             <a:pPr>
@@ -4759,9 +4748,12 @@
 </file>
 
 <file path=customXml/item1.xml><?xml version="1.0" encoding="utf-8"?>
-<p:properties xmlns:p="http://schemas.microsoft.com/office/2006/metadata/properties" xmlns:xsi="http://www.w3.org/2001/XMLSchema-instance" xmlns:pc="http://schemas.microsoft.com/office/infopath/2007/PartnerControls">
-  <documentManagement/>
-</p:properties>
+<?mso-contentType ?>
+<FormTemplates xmlns="http://schemas.microsoft.com/sharepoint/v3/contenttype/forms">
+  <Display>DocumentLibraryForm</Display>
+  <Edit>DocumentLibraryForm</Edit>
+  <New>DocumentLibraryForm</New>
+</FormTemplates>
 </file>
 
 <file path=customXml/item2.xml><?xml version="1.0" encoding="utf-8"?>
@@ -4814,25 +4806,15 @@
 </file>
 
 <file path=customXml/item3.xml><?xml version="1.0" encoding="utf-8"?>
-<?mso-contentType ?>
-<FormTemplates xmlns="http://schemas.microsoft.com/sharepoint/v3/contenttype/forms">
-  <Display>DocumentLibraryForm</Display>
-  <Edit>DocumentLibraryForm</Edit>
-  <New>DocumentLibraryForm</New>
-</FormTemplates>
+<p:properties xmlns:p="http://schemas.microsoft.com/office/2006/metadata/properties" xmlns:xsi="http://www.w3.org/2001/XMLSchema-instance" xmlns:pc="http://schemas.microsoft.com/office/infopath/2007/PartnerControls">
+  <documentManagement/>
+</p:properties>
 </file>
 
 <file path=customXml/itemProps1.xml><?xml version="1.0" encoding="utf-8"?>
-<ds:datastoreItem xmlns:ds="http://schemas.openxmlformats.org/officeDocument/2006/customXml" ds:itemID="{A50EC660-24D0-43A0-AE5E-E274115E726B}">
+<ds:datastoreItem xmlns:ds="http://schemas.openxmlformats.org/officeDocument/2006/customXml" ds:itemID="{19E20559-B232-4371-8690-E3D8007EDB82}">
   <ds:schemaRefs>
-    <ds:schemaRef ds:uri="http://purl.org/dc/elements/1.1/"/>
-    <ds:schemaRef ds:uri="http://schemas.microsoft.com/office/2006/metadata/properties"/>
-    <ds:schemaRef ds:uri="http://purl.org/dc/terms/"/>
-    <ds:schemaRef ds:uri="http://schemas.openxmlformats.org/package/2006/metadata/core-properties"/>
-    <ds:schemaRef ds:uri="http://schemas.microsoft.com/office/2006/documentManagement/types"/>
-    <ds:schemaRef ds:uri="http://www.w3.org/XML/1998/namespace"/>
-    <ds:schemaRef ds:uri="http://purl.org/dc/dcmitype/"/>
-    <ds:schemaRef ds:uri="http://schemas.microsoft.com/office/infopath/2007/PartnerControls"/>
+    <ds:schemaRef ds:uri="http://schemas.microsoft.com/sharepoint/v3/contenttype/forms"/>
   </ds:schemaRefs>
 </ds:datastoreItem>
 </file>
@@ -4853,9 +4835,16 @@
 </file>
 
 <file path=customXml/itemProps3.xml><?xml version="1.0" encoding="utf-8"?>
-<ds:datastoreItem xmlns:ds="http://schemas.openxmlformats.org/officeDocument/2006/customXml" ds:itemID="{19E20559-B232-4371-8690-E3D8007EDB82}">
+<ds:datastoreItem xmlns:ds="http://schemas.openxmlformats.org/officeDocument/2006/customXml" ds:itemID="{A50EC660-24D0-43A0-AE5E-E274115E726B}">
   <ds:schemaRefs>
-    <ds:schemaRef ds:uri="http://schemas.microsoft.com/sharepoint/v3/contenttype/forms"/>
+    <ds:schemaRef ds:uri="http://purl.org/dc/elements/1.1/"/>
+    <ds:schemaRef ds:uri="http://schemas.microsoft.com/office/2006/metadata/properties"/>
+    <ds:schemaRef ds:uri="http://purl.org/dc/terms/"/>
+    <ds:schemaRef ds:uri="http://schemas.openxmlformats.org/package/2006/metadata/core-properties"/>
+    <ds:schemaRef ds:uri="http://schemas.microsoft.com/office/2006/documentManagement/types"/>
+    <ds:schemaRef ds:uri="http://www.w3.org/XML/1998/namespace"/>
+    <ds:schemaRef ds:uri="http://purl.org/dc/dcmitype/"/>
+    <ds:schemaRef ds:uri="http://schemas.microsoft.com/office/infopath/2007/PartnerControls"/>
   </ds:schemaRefs>
 </ds:datastoreItem>
 </file>
</xml_diff>

<commit_message>
Added LANL to license now.
</commit_message>
<xml_diff>
--- a/presentations/license-master.pptx
+++ b/presentations/license-master.pptx
@@ -255,7 +255,7 @@
           <a:p>
             <a:fld id="{0B842F42-2CE9-4E35-95C1-410DC08A50B1}" type="datetimeFigureOut">
               <a:rPr lang="en-US" smtClean="0"/>
-              <a:t>9/23/2020</a:t>
+              <a:t>9/27/20</a:t>
             </a:fld>
             <a:endParaRPr lang="en-US"/>
           </a:p>
@@ -420,7 +420,7 @@
           <a:p>
             <a:fld id="{6F282904-F315-4730-8D91-37D99E141A6F}" type="datetimeFigureOut">
               <a:rPr lang="en-US" smtClean="0"/>
-              <a:t>9/23/2020</a:t>
+              <a:t>9/27/20</a:t>
             </a:fld>
             <a:endParaRPr lang="en-US"/>
           </a:p>
@@ -3543,7 +3543,12 @@
             <p:ph type="title"/>
           </p:nvPr>
         </p:nvSpPr>
-        <p:spPr/>
+        <p:spPr>
+          <a:xfrm>
+            <a:off x="363096" y="112911"/>
+            <a:ext cx="11372473" cy="914400"/>
+          </a:xfrm>
+        </p:spPr>
         <p:txBody>
           <a:bodyPr/>
           <a:lstStyle/>
@@ -3573,7 +3578,7 @@
         </p:nvSpPr>
         <p:spPr>
           <a:xfrm>
-            <a:off x="365760" y="862719"/>
+            <a:off x="409507" y="570111"/>
             <a:ext cx="11369809" cy="4047778"/>
           </a:xfrm>
         </p:spPr>
@@ -3672,30 +3677,30 @@
               </a:spcBef>
             </a:pPr>
             <a:r>
-              <a:rPr lang="en-US" sz="1600" dirty="0"/>
+              <a:rPr lang="en-US" sz="1400" dirty="0"/>
               <a:t>Additional contributors include: Mike </a:t>
             </a:r>
             <a:r>
-              <a:rPr lang="en-US" sz="1600" dirty="0" err="1"/>
+              <a:rPr lang="en-US" sz="1400" dirty="0" err="1"/>
               <a:t>Heroux</a:t>
             </a:r>
             <a:r>
-              <a:rPr lang="en-US" sz="1600" dirty="0"/>
+              <a:rPr lang="en-US" sz="1400" dirty="0"/>
               <a:t>, Alicia </a:t>
             </a:r>
             <a:r>
-              <a:rPr lang="en-US" sz="1600" dirty="0" err="1"/>
+              <a:rPr lang="en-US" sz="1400" dirty="0" err="1"/>
               <a:t>Klinvex</a:t>
             </a:r>
             <a:r>
-              <a:rPr lang="en-US" sz="1600" dirty="0"/>
+              <a:rPr lang="en-US" sz="1400" dirty="0"/>
               <a:t>, Mark Miller, Jared O’Neal, Katherine Riley, David Rogers, Deborah Stevens, James </a:t>
             </a:r>
             <a:r>
-              <a:rPr lang="en-US" sz="1600" dirty="0" err="1"/>
+              <a:rPr lang="en-US" sz="1400" dirty="0" err="1"/>
               <a:t>Willenbring</a:t>
             </a:r>
-            <a:endParaRPr lang="en-US" sz="1600" dirty="0"/>
+            <a:endParaRPr lang="en-US" sz="1400" dirty="0"/>
           </a:p>
           <a:p>
             <a:pPr>
@@ -3704,22 +3709,22 @@
               </a:spcBef>
             </a:pPr>
             <a:r>
-              <a:rPr lang="en-US" sz="1600" dirty="0"/>
+              <a:rPr lang="en-US" sz="1400" dirty="0"/>
               <a:t>This work was supported by the U.S. Department of Energy Office of Science, Office of Advanced Scientific Computing Research (ASCR), and by the </a:t>
             </a:r>
             <a:r>
-              <a:rPr lang="en-US" sz="1600" dirty="0" err="1"/>
+              <a:rPr lang="en-US" sz="1400" dirty="0" err="1"/>
               <a:t>Exascale</a:t>
             </a:r>
             <a:r>
-              <a:rPr lang="en-US" sz="1600" dirty="0"/>
+              <a:rPr lang="en-US" sz="1400" dirty="0"/>
               <a:t> Computing Project (17-SC-20-SC), a collaborative effort of the U.S. Department of Energy Office of Science and the National Nuclear Security Administration</a:t>
             </a:r>
             <a:r>
-              <a:rPr lang="en-US" sz="1600" i="1" dirty="0"/>
+              <a:rPr lang="en-US" sz="1400" i="1" dirty="0"/>
               <a:t>.</a:t>
             </a:r>
-            <a:endParaRPr lang="en-US" sz="1600" dirty="0"/>
+            <a:endParaRPr lang="en-US" sz="1400" dirty="0"/>
           </a:p>
           <a:p>
             <a:pPr>
@@ -3728,15 +3733,15 @@
               </a:spcBef>
             </a:pPr>
             <a:r>
-              <a:rPr lang="en-US" sz="1600" dirty="0"/>
+              <a:rPr lang="en-US" sz="1400" dirty="0"/>
               <a:t>This work was performed in part at the Argonne National Laboratory, which is managed by </a:t>
             </a:r>
             <a:r>
-              <a:rPr lang="en-US" sz="1600" dirty="0" err="1"/>
+              <a:rPr lang="en-US" sz="1400" dirty="0" err="1"/>
               <a:t>UChicago</a:t>
             </a:r>
             <a:r>
-              <a:rPr lang="en-US" sz="1600" dirty="0"/>
+              <a:rPr lang="en-US" sz="1400" dirty="0"/>
               <a:t> Argonne, LLC for the U.S. Department of Energy under Contract No. DE-AC02-06CH11357.</a:t>
             </a:r>
           </a:p>
@@ -3747,7 +3752,7 @@
               </a:spcBef>
             </a:pPr>
             <a:r>
-              <a:rPr lang="en-US" sz="1600" dirty="0"/>
+              <a:rPr lang="en-US" sz="1400" dirty="0"/>
               <a:t>This work was performed in part at the Oak Ridge National Laboratory, which is managed by UT-Battelle, LLC for the U.S. Department of Energy under Contract No. DE-AC05-00OR22725.</a:t>
             </a:r>
           </a:p>
@@ -3758,7 +3763,7 @@
               </a:spcBef>
             </a:pPr>
             <a:r>
-              <a:rPr lang="en-US" sz="1600" dirty="0"/>
+              <a:rPr lang="en-US" sz="1400" dirty="0"/>
               <a:t>This work was performed in part at the Lawrence Livermore National Laboratory, which is managed by Lawrence Livermore National Security, LLC for the U.S. Department of Energy under Contract No. DE-AC52-07NA27344.</a:t>
             </a:r>
           </a:p>
@@ -3769,8 +3774,31 @@
               </a:spcBef>
             </a:pPr>
             <a:r>
+              <a:rPr lang="en-US" sz="1400" dirty="0"/>
+              <a:t>This work was performed in part at the Los Alamos National Laboratory, which is managed </a:t>
+            </a:r>
+            <a:r>
+              <a:rPr lang="en-US" sz="1400" dirty="0" err="1"/>
+              <a:t>byTriad</a:t>
+            </a:r>
+            <a:r>
+              <a:rPr lang="en-US" sz="1400" dirty="0"/>
+              <a:t> National Security, LLC for the U.S. Department of Energy under Contract No.89233218CNA000001</a:t>
+            </a:r>
+          </a:p>
+          <a:p>
+            <a:pPr>
+              <a:spcBef>
+                <a:spcPts val="400"/>
+              </a:spcBef>
+            </a:pPr>
+            <a:r>
+              <a:rPr lang="en-US" sz="1400" dirty="0"/>
+              <a:t>This work was performed in part at Sandia National Laboratories. Sandia National Laboratories is a multi-mission laboratory managed and operated by National Technology and Engineering Solutions of Sandia, LLC., a wholly owned subsidiary of Honeywell International, Inc., for the U.S. Department of Energy’s National Nuclear Security Administration under contract DE-NA0003525</a:t>
+            </a:r>
+            <a:r>
               <a:rPr lang="en-US" sz="1600" dirty="0"/>
-              <a:t>This work was performed in part at Sandia National Laboratories. Sandia National Laboratories is a multi-mission laboratory managed and operated by National Technology and Engineering Solutions of Sandia, LLC., a wholly owned subsidiary of Honeywell International, Inc., for the U.S. Department of Energy’s National Nuclear Security Administration under contract DE-NA0003525.</a:t>
+              <a:t>.</a:t>
             </a:r>
           </a:p>
         </p:txBody>
@@ -4748,12 +4776,9 @@
 </file>
 
 <file path=customXml/item1.xml><?xml version="1.0" encoding="utf-8"?>
-<?mso-contentType ?>
-<FormTemplates xmlns="http://schemas.microsoft.com/sharepoint/v3/contenttype/forms">
-  <Display>DocumentLibraryForm</Display>
-  <Edit>DocumentLibraryForm</Edit>
-  <New>DocumentLibraryForm</New>
-</FormTemplates>
+<p:properties xmlns:p="http://schemas.microsoft.com/office/2006/metadata/properties" xmlns:xsi="http://www.w3.org/2001/XMLSchema-instance" xmlns:pc="http://schemas.microsoft.com/office/infopath/2007/PartnerControls">
+  <documentManagement/>
+</p:properties>
 </file>
 
 <file path=customXml/item2.xml><?xml version="1.0" encoding="utf-8"?>
@@ -4806,15 +4831,25 @@
 </file>
 
 <file path=customXml/item3.xml><?xml version="1.0" encoding="utf-8"?>
-<p:properties xmlns:p="http://schemas.microsoft.com/office/2006/metadata/properties" xmlns:xsi="http://www.w3.org/2001/XMLSchema-instance" xmlns:pc="http://schemas.microsoft.com/office/infopath/2007/PartnerControls">
-  <documentManagement/>
-</p:properties>
+<?mso-contentType ?>
+<FormTemplates xmlns="http://schemas.microsoft.com/sharepoint/v3/contenttype/forms">
+  <Display>DocumentLibraryForm</Display>
+  <Edit>DocumentLibraryForm</Edit>
+  <New>DocumentLibraryForm</New>
+</FormTemplates>
 </file>
 
 <file path=customXml/itemProps1.xml><?xml version="1.0" encoding="utf-8"?>
-<ds:datastoreItem xmlns:ds="http://schemas.openxmlformats.org/officeDocument/2006/customXml" ds:itemID="{19E20559-B232-4371-8690-E3D8007EDB82}">
+<ds:datastoreItem xmlns:ds="http://schemas.openxmlformats.org/officeDocument/2006/customXml" ds:itemID="{A50EC660-24D0-43A0-AE5E-E274115E726B}">
   <ds:schemaRefs>
-    <ds:schemaRef ds:uri="http://schemas.microsoft.com/sharepoint/v3/contenttype/forms"/>
+    <ds:schemaRef ds:uri="http://purl.org/dc/elements/1.1/"/>
+    <ds:schemaRef ds:uri="http://schemas.microsoft.com/office/2006/metadata/properties"/>
+    <ds:schemaRef ds:uri="http://purl.org/dc/terms/"/>
+    <ds:schemaRef ds:uri="http://schemas.openxmlformats.org/package/2006/metadata/core-properties"/>
+    <ds:schemaRef ds:uri="http://schemas.microsoft.com/office/2006/documentManagement/types"/>
+    <ds:schemaRef ds:uri="http://www.w3.org/XML/1998/namespace"/>
+    <ds:schemaRef ds:uri="http://purl.org/dc/dcmitype/"/>
+    <ds:schemaRef ds:uri="http://schemas.microsoft.com/office/infopath/2007/PartnerControls"/>
   </ds:schemaRefs>
 </ds:datastoreItem>
 </file>
@@ -4835,16 +4870,9 @@
 </file>
 
 <file path=customXml/itemProps3.xml><?xml version="1.0" encoding="utf-8"?>
-<ds:datastoreItem xmlns:ds="http://schemas.openxmlformats.org/officeDocument/2006/customXml" ds:itemID="{A50EC660-24D0-43A0-AE5E-E274115E726B}">
+<ds:datastoreItem xmlns:ds="http://schemas.openxmlformats.org/officeDocument/2006/customXml" ds:itemID="{19E20559-B232-4371-8690-E3D8007EDB82}">
   <ds:schemaRefs>
-    <ds:schemaRef ds:uri="http://purl.org/dc/elements/1.1/"/>
-    <ds:schemaRef ds:uri="http://schemas.microsoft.com/office/2006/metadata/properties"/>
-    <ds:schemaRef ds:uri="http://purl.org/dc/terms/"/>
-    <ds:schemaRef ds:uri="http://schemas.openxmlformats.org/package/2006/metadata/core-properties"/>
-    <ds:schemaRef ds:uri="http://schemas.microsoft.com/office/2006/documentManagement/types"/>
-    <ds:schemaRef ds:uri="http://www.w3.org/XML/1998/namespace"/>
-    <ds:schemaRef ds:uri="http://purl.org/dc/dcmitype/"/>
-    <ds:schemaRef ds:uri="http://schemas.microsoft.com/office/infopath/2007/PartnerControls"/>
+    <ds:schemaRef ds:uri="http://schemas.microsoft.com/sharepoint/v3/contenttype/forms"/>
   </ds:schemaRefs>
 </ds:datastoreItem>
 </file>
</xml_diff>

<commit_message>
Ensure consistent font size in acknowledgments section
</commit_message>
<xml_diff>
--- a/presentations/license-master.pptx
+++ b/presentations/license-master.pptx
@@ -255,7 +255,7 @@
           <a:p>
             <a:fld id="{0B842F42-2CE9-4E35-95C1-410DC08A50B1}" type="datetimeFigureOut">
               <a:rPr lang="en-US" smtClean="0"/>
-              <a:t>9/27/20</a:t>
+              <a:t>9/28/2020</a:t>
             </a:fld>
             <a:endParaRPr lang="en-US"/>
           </a:p>
@@ -420,7 +420,7 @@
           <a:p>
             <a:fld id="{6F282904-F315-4730-8D91-37D99E141A6F}" type="datetimeFigureOut">
               <a:rPr lang="en-US" smtClean="0"/>
-              <a:t>9/27/20</a:t>
+              <a:t>9/28/2020</a:t>
             </a:fld>
             <a:endParaRPr lang="en-US"/>
           </a:p>
@@ -3775,15 +3775,7 @@
             </a:pPr>
             <a:r>
               <a:rPr lang="en-US" sz="1400" dirty="0"/>
-              <a:t>This work was performed in part at the Los Alamos National Laboratory, which is </a:t>
-            </a:r>
-            <a:r>
-              <a:rPr lang="en-US" sz="1400"/>
-              <a:t>managed by Triad </a:t>
-            </a:r>
-            <a:r>
-              <a:rPr lang="en-US" sz="1400" dirty="0"/>
-              <a:t>National Security, LLC for the U.S. Department of Energy under Contract No.89233218CNA000001</a:t>
+              <a:t>This work was performed in part at the Los Alamos National Laboratory, which is managed by Triad National Security, LLC for the U.S. Department of Energy under Contract No.89233218CNA000001</a:t>
             </a:r>
           </a:p>
           <a:p>
@@ -3794,11 +3786,7 @@
             </a:pPr>
             <a:r>
               <a:rPr lang="en-US" sz="1400" dirty="0"/>
-              <a:t>This work was performed in part at Sandia National Laboratories. Sandia National Laboratories is a multi-mission laboratory managed and operated by National Technology and Engineering Solutions of Sandia, LLC., a wholly owned subsidiary of Honeywell International, Inc., for the U.S. Department of Energy’s National Nuclear Security Administration under contract DE-NA0003525</a:t>
-            </a:r>
-            <a:r>
-              <a:rPr lang="en-US" sz="1600" dirty="0"/>
-              <a:t>.</a:t>
+              <a:t>This work was performed in part at Sandia National Laboratories. Sandia National Laboratories is a multi-mission laboratory managed and operated by National Technology and Engineering Solutions of Sandia, LLC., a wholly owned subsidiary of Honeywell International, Inc., for the U.S. Department of Energy’s National Nuclear Security Administration under contract DE-NA0003525.</a:t>
             </a:r>
           </a:p>
         </p:txBody>
@@ -4776,12 +4764,9 @@
 </file>
 
 <file path=customXml/item1.xml><?xml version="1.0" encoding="utf-8"?>
-<?mso-contentType ?>
-<FormTemplates xmlns="http://schemas.microsoft.com/sharepoint/v3/contenttype/forms">
-  <Display>DocumentLibraryForm</Display>
-  <Edit>DocumentLibraryForm</Edit>
-  <New>DocumentLibraryForm</New>
-</FormTemplates>
+<p:properties xmlns:p="http://schemas.microsoft.com/office/2006/metadata/properties" xmlns:xsi="http://www.w3.org/2001/XMLSchema-instance" xmlns:pc="http://schemas.microsoft.com/office/infopath/2007/PartnerControls">
+  <documentManagement/>
+</p:properties>
 </file>
 
 <file path=customXml/item2.xml><?xml version="1.0" encoding="utf-8"?>
@@ -4834,15 +4819,25 @@
 </file>
 
 <file path=customXml/item3.xml><?xml version="1.0" encoding="utf-8"?>
-<p:properties xmlns:p="http://schemas.microsoft.com/office/2006/metadata/properties" xmlns:xsi="http://www.w3.org/2001/XMLSchema-instance" xmlns:pc="http://schemas.microsoft.com/office/infopath/2007/PartnerControls">
-  <documentManagement/>
-</p:properties>
+<?mso-contentType ?>
+<FormTemplates xmlns="http://schemas.microsoft.com/sharepoint/v3/contenttype/forms">
+  <Display>DocumentLibraryForm</Display>
+  <Edit>DocumentLibraryForm</Edit>
+  <New>DocumentLibraryForm</New>
+</FormTemplates>
 </file>
 
 <file path=customXml/itemProps1.xml><?xml version="1.0" encoding="utf-8"?>
-<ds:datastoreItem xmlns:ds="http://schemas.openxmlformats.org/officeDocument/2006/customXml" ds:itemID="{19E20559-B232-4371-8690-E3D8007EDB82}">
+<ds:datastoreItem xmlns:ds="http://schemas.openxmlformats.org/officeDocument/2006/customXml" ds:itemID="{A50EC660-24D0-43A0-AE5E-E274115E726B}">
   <ds:schemaRefs>
-    <ds:schemaRef ds:uri="http://schemas.microsoft.com/sharepoint/v3/contenttype/forms"/>
+    <ds:schemaRef ds:uri="http://purl.org/dc/elements/1.1/"/>
+    <ds:schemaRef ds:uri="http://schemas.microsoft.com/office/2006/metadata/properties"/>
+    <ds:schemaRef ds:uri="http://purl.org/dc/terms/"/>
+    <ds:schemaRef ds:uri="http://schemas.openxmlformats.org/package/2006/metadata/core-properties"/>
+    <ds:schemaRef ds:uri="http://schemas.microsoft.com/office/2006/documentManagement/types"/>
+    <ds:schemaRef ds:uri="http://www.w3.org/XML/1998/namespace"/>
+    <ds:schemaRef ds:uri="http://purl.org/dc/dcmitype/"/>
+    <ds:schemaRef ds:uri="http://schemas.microsoft.com/office/infopath/2007/PartnerControls"/>
   </ds:schemaRefs>
 </ds:datastoreItem>
 </file>
@@ -4863,16 +4858,9 @@
 </file>
 
 <file path=customXml/itemProps3.xml><?xml version="1.0" encoding="utf-8"?>
-<ds:datastoreItem xmlns:ds="http://schemas.openxmlformats.org/officeDocument/2006/customXml" ds:itemID="{A50EC660-24D0-43A0-AE5E-E274115E726B}">
+<ds:datastoreItem xmlns:ds="http://schemas.openxmlformats.org/officeDocument/2006/customXml" ds:itemID="{19E20559-B232-4371-8690-E3D8007EDB82}">
   <ds:schemaRefs>
-    <ds:schemaRef ds:uri="http://purl.org/dc/elements/1.1/"/>
-    <ds:schemaRef ds:uri="http://schemas.microsoft.com/office/2006/metadata/properties"/>
-    <ds:schemaRef ds:uri="http://purl.org/dc/terms/"/>
-    <ds:schemaRef ds:uri="http://schemas.openxmlformats.org/package/2006/metadata/core-properties"/>
-    <ds:schemaRef ds:uri="http://schemas.microsoft.com/office/2006/documentManagement/types"/>
-    <ds:schemaRef ds:uri="http://www.w3.org/XML/1998/namespace"/>
-    <ds:schemaRef ds:uri="http://purl.org/dc/dcmitype/"/>
-    <ds:schemaRef ds:uri="http://schemas.microsoft.com/office/infopath/2007/PartnerControls"/>
+    <ds:schemaRef ds:uri="http://schemas.microsoft.com/sharepoint/v3/contenttype/forms"/>
   </ds:schemaRefs>
 </ds:datastoreItem>
 </file>
</xml_diff>